<commit_message>
Add Paul as Eagle Comm Coord
</commit_message>
<xml_diff>
--- a/2013/committeeMeetingNotes/CommitteeMinutes20130917.pptx
+++ b/2013/committeeMeetingNotes/CommitteeMinutes20130917.pptx
@@ -5434,7 +5434,7 @@
           <p:nvPr>
             <p:extLst>
               <p:ext uri="{D42A27DB-BD31-4B8C-83A1-F6EECF244321}">
-                <p14:modId xmlns:p14="http://schemas.microsoft.com/office/powerpoint/2010/main" val="267535552"/>
+                <p14:modId xmlns:p14="http://schemas.microsoft.com/office/powerpoint/2010/main" val="621028597"/>
               </p:ext>
             </p:extLst>
           </p:nvPr>
@@ -6473,7 +6473,67 @@
                           <a:ea typeface="Calibri"/>
                           <a:cs typeface="Times New Roman"/>
                         </a:rPr>
-                        <a:t>Wise Guys Patrol Leader</a:t>
+                        <a:t>Wise </a:t>
+                      </a:r>
+                      <a:r>
+                        <a:rPr lang="en-US" sz="1000" dirty="0" smtClean="0">
+                          <a:solidFill>
+                            <a:srgbClr val="000000"/>
+                          </a:solidFill>
+                          <a:effectLst/>
+                          <a:latin typeface="Calibri"/>
+                          <a:ea typeface="Calibri"/>
+                          <a:cs typeface="Times New Roman"/>
+                        </a:rPr>
+                        <a:t>Guys </a:t>
+                      </a:r>
+                      <a:r>
+                        <a:rPr lang="en-US" sz="1000" smtClean="0">
+                          <a:solidFill>
+                            <a:srgbClr val="000000"/>
+                          </a:solidFill>
+                          <a:effectLst/>
+                          <a:latin typeface="Calibri"/>
+                          <a:ea typeface="Calibri"/>
+                          <a:cs typeface="Times New Roman"/>
+                        </a:rPr>
+                        <a:t>(Sr.)</a:t>
+                      </a:r>
+                      <a:r>
+                        <a:rPr lang="en-US" sz="1000" baseline="0" smtClean="0">
+                          <a:solidFill>
+                            <a:srgbClr val="000000"/>
+                          </a:solidFill>
+                          <a:effectLst/>
+                          <a:latin typeface="Calibri"/>
+                          <a:ea typeface="Calibri"/>
+                          <a:cs typeface="Times New Roman"/>
+                        </a:rPr>
+                        <a:t> </a:t>
+                      </a:r>
+                      <a:r>
+                        <a:rPr lang="en-US" sz="1000" smtClean="0">
+                          <a:solidFill>
+                            <a:srgbClr val="000000"/>
+                          </a:solidFill>
+                          <a:effectLst/>
+                          <a:latin typeface="Calibri"/>
+                          <a:ea typeface="Calibri"/>
+                          <a:cs typeface="Times New Roman"/>
+                        </a:rPr>
+                        <a:t> </a:t>
+                      </a:r>
+                      <a:r>
+                        <a:rPr lang="en-US" sz="1000" dirty="0">
+                          <a:solidFill>
+                            <a:srgbClr val="000000"/>
+                          </a:solidFill>
+                          <a:effectLst/>
+                          <a:latin typeface="Calibri"/>
+                          <a:ea typeface="Calibri"/>
+                          <a:cs typeface="Times New Roman"/>
+                        </a:rPr>
+                        <a:t>Patrol Leader</a:t>
                       </a:r>
                     </a:p>
                   </a:txBody>
@@ -7183,14 +7243,14 @@
           <p:nvPr>
             <p:extLst>
               <p:ext uri="{D42A27DB-BD31-4B8C-83A1-F6EECF244321}">
-                <p14:modId xmlns:p14="http://schemas.microsoft.com/office/powerpoint/2010/main" val="2738872766"/>
+                <p14:modId xmlns:p14="http://schemas.microsoft.com/office/powerpoint/2010/main" val="1288801631"/>
               </p:ext>
             </p:extLst>
           </p:nvPr>
         </p:nvGraphicFramePr>
         <p:xfrm>
           <a:off x="5399705" y="163792"/>
-          <a:ext cx="3581400" cy="5167146"/>
+          <a:ext cx="3581400" cy="5487500"/>
         </p:xfrm>
         <a:graphic>
           <a:graphicData uri="http://schemas.openxmlformats.org/drawingml/2006/table">
@@ -8493,6 +8553,102 @@
                           <a:cs typeface="Times New Roman"/>
                         </a:rPr>
                         <a:t>Trek Coordinator</a:t>
+                      </a:r>
+                      <a:endParaRPr lang="en-US" sz="900" b="0" i="1" dirty="0">
+                        <a:solidFill>
+                          <a:srgbClr val="000000"/>
+                        </a:solidFill>
+                        <a:effectLst/>
+                        <a:latin typeface="Calibri"/>
+                        <a:ea typeface="Calibri"/>
+                        <a:cs typeface="Times New Roman"/>
+                      </a:endParaRPr>
+                    </a:p>
+                  </a:txBody>
+                  <a:tcPr marT="0" marB="0"/>
+                </a:tc>
+              </a:tr>
+              <a:tr h="320354">
+                <a:tc>
+                  <a:txBody>
+                    <a:bodyPr/>
+                    <a:lstStyle/>
+                    <a:p>
+                      <a:pPr marL="0" marR="0">
+                        <a:lnSpc>
+                          <a:spcPct val="115000"/>
+                        </a:lnSpc>
+                        <a:spcBef>
+                          <a:spcPts val="0"/>
+                        </a:spcBef>
+                        <a:spcAft>
+                          <a:spcPts val="0"/>
+                        </a:spcAft>
+                      </a:pPr>
+                      <a:r>
+                        <a:rPr lang="en-US" sz="900" b="1" dirty="0" smtClean="0">
+                          <a:solidFill>
+                            <a:srgbClr val="000000"/>
+                          </a:solidFill>
+                          <a:effectLst/>
+                          <a:latin typeface="Calibri"/>
+                          <a:ea typeface="Calibri"/>
+                          <a:cs typeface="Times New Roman"/>
+                        </a:rPr>
+                        <a:t>Paul </a:t>
+                      </a:r>
+                      <a:r>
+                        <a:rPr lang="en-US" sz="900" b="1" dirty="0" err="1" smtClean="0">
+                          <a:solidFill>
+                            <a:srgbClr val="000000"/>
+                          </a:solidFill>
+                          <a:effectLst/>
+                          <a:latin typeface="Calibri"/>
+                          <a:ea typeface="Calibri"/>
+                          <a:cs typeface="Times New Roman"/>
+                        </a:rPr>
+                        <a:t>Besser</a:t>
+                      </a:r>
+                      <a:endParaRPr lang="en-US" sz="900" b="1" dirty="0">
+                        <a:solidFill>
+                          <a:srgbClr val="000000"/>
+                        </a:solidFill>
+                        <a:effectLst/>
+                        <a:latin typeface="Calibri"/>
+                        <a:ea typeface="Calibri"/>
+                        <a:cs typeface="Times New Roman"/>
+                      </a:endParaRPr>
+                    </a:p>
+                  </a:txBody>
+                  <a:tcPr marT="0" marB="0"/>
+                </a:tc>
+                <a:tc>
+                  <a:txBody>
+                    <a:bodyPr/>
+                    <a:lstStyle/>
+                    <a:p>
+                      <a:pPr marL="0" marR="0">
+                        <a:lnSpc>
+                          <a:spcPct val="115000"/>
+                        </a:lnSpc>
+                        <a:spcBef>
+                          <a:spcPts val="0"/>
+                        </a:spcBef>
+                        <a:spcAft>
+                          <a:spcPts val="0"/>
+                        </a:spcAft>
+                      </a:pPr>
+                      <a:r>
+                        <a:rPr lang="en-US" sz="900" b="0" i="1" dirty="0" smtClean="0">
+                          <a:solidFill>
+                            <a:srgbClr val="000000"/>
+                          </a:solidFill>
+                          <a:effectLst/>
+                          <a:latin typeface="Calibri"/>
+                          <a:ea typeface="Calibri"/>
+                          <a:cs typeface="Times New Roman"/>
+                        </a:rPr>
+                        <a:t>Eagle Committee Coordinator</a:t>
                       </a:r>
                       <a:endParaRPr lang="en-US" sz="900" b="0" i="1" dirty="0">
                         <a:solidFill>

</xml_diff>